<commit_message>
Fixed some typos in project outputs/presentations.
</commit_message>
<xml_diff>
--- a/R/STAT 601 - Applied Statistics I/Project 4 - Mixed Effects Model Analysis Typing Dynamics/Project 4 Powerpoint - Gavin Gunawardena.pptx
+++ b/R/STAT 601 - Applied Statistics I/Project 4 - Mixed Effects Model Analysis Typing Dynamics/Project 4 Powerpoint - Gavin Gunawardena.pptx
@@ -177,6 +177,9 @@
         </p14:section>
       </p14:sectionLst>
     </p:ext>
+    <p:ext uri="{EFAFB233-063F-42B5-8137-9DF3F51BA10A}">
+      <p15:sldGuideLst xmlns:p15="http://schemas.microsoft.com/office/powerpoint/2012/main"/>
+    </p:ext>
   </p:extLst>
 </p:presentation>
 </file>
@@ -263,7 +266,7 @@
           <a:p>
             <a:fld id="{684D9C8F-DEEA-405E-AE1B-A74D7D27F3C2}" type="datetimeFigureOut">
               <a:rPr lang="en-US" smtClean="0"/>
-              <a:t>12/15/2021</a:t>
+              <a:t>6/10/2022</a:t>
             </a:fld>
             <a:endParaRPr lang="en-US"/>
           </a:p>
@@ -1592,7 +1595,7 @@
           <a:p>
             <a:fld id="{4FC59F93-7EE2-4DD2-AA76-4C21107A99A8}" type="datetimeFigureOut">
               <a:rPr lang="en-US" smtClean="0"/>
-              <a:t>12/15/2021</a:t>
+              <a:t>6/10/2022</a:t>
             </a:fld>
             <a:endParaRPr lang="en-US"/>
           </a:p>
@@ -1843,7 +1846,7 @@
           <a:p>
             <a:fld id="{4FC59F93-7EE2-4DD2-AA76-4C21107A99A8}" type="datetimeFigureOut">
               <a:rPr lang="en-US" smtClean="0"/>
-              <a:t>12/15/2021</a:t>
+              <a:t>6/10/2022</a:t>
             </a:fld>
             <a:endParaRPr lang="en-US"/>
           </a:p>
@@ -2157,7 +2160,7 @@
           <a:p>
             <a:fld id="{4FC59F93-7EE2-4DD2-AA76-4C21107A99A8}" type="datetimeFigureOut">
               <a:rPr lang="en-US" smtClean="0"/>
-              <a:t>12/15/2021</a:t>
+              <a:t>6/10/2022</a:t>
             </a:fld>
             <a:endParaRPr lang="en-US"/>
           </a:p>
@@ -2498,7 +2501,7 @@
           <a:p>
             <a:fld id="{4FC59F93-7EE2-4DD2-AA76-4C21107A99A8}" type="datetimeFigureOut">
               <a:rPr lang="en-US" smtClean="0"/>
-              <a:t>12/15/2021</a:t>
+              <a:t>6/10/2022</a:t>
             </a:fld>
             <a:endParaRPr lang="en-US"/>
           </a:p>
@@ -2812,7 +2815,7 @@
           <a:p>
             <a:fld id="{4FC59F93-7EE2-4DD2-AA76-4C21107A99A8}" type="datetimeFigureOut">
               <a:rPr lang="en-US" smtClean="0"/>
-              <a:t>12/15/2021</a:t>
+              <a:t>6/10/2022</a:t>
             </a:fld>
             <a:endParaRPr lang="en-US"/>
           </a:p>
@@ -3205,7 +3208,7 @@
           <a:p>
             <a:fld id="{4FC59F93-7EE2-4DD2-AA76-4C21107A99A8}" type="datetimeFigureOut">
               <a:rPr lang="en-US" smtClean="0"/>
-              <a:t>12/15/2021</a:t>
+              <a:t>6/10/2022</a:t>
             </a:fld>
             <a:endParaRPr lang="en-US"/>
           </a:p>
@@ -3375,7 +3378,7 @@
           <a:p>
             <a:fld id="{4FC59F93-7EE2-4DD2-AA76-4C21107A99A8}" type="datetimeFigureOut">
               <a:rPr lang="en-US" smtClean="0"/>
-              <a:t>12/15/2021</a:t>
+              <a:t>6/10/2022</a:t>
             </a:fld>
             <a:endParaRPr lang="en-US"/>
           </a:p>
@@ -3555,7 +3558,7 @@
           <a:p>
             <a:fld id="{4FC59F93-7EE2-4DD2-AA76-4C21107A99A8}" type="datetimeFigureOut">
               <a:rPr lang="en-US" smtClean="0"/>
-              <a:t>12/15/2021</a:t>
+              <a:t>6/10/2022</a:t>
             </a:fld>
             <a:endParaRPr lang="en-US"/>
           </a:p>
@@ -3731,7 +3734,7 @@
           <a:p>
             <a:fld id="{4FC59F93-7EE2-4DD2-AA76-4C21107A99A8}" type="datetimeFigureOut">
               <a:rPr lang="en-US" smtClean="0"/>
-              <a:t>12/15/2021</a:t>
+              <a:t>6/10/2022</a:t>
             </a:fld>
             <a:endParaRPr lang="en-US"/>
           </a:p>
@@ -3978,7 +3981,7 @@
           <a:p>
             <a:fld id="{4FC59F93-7EE2-4DD2-AA76-4C21107A99A8}" type="datetimeFigureOut">
               <a:rPr lang="en-US" smtClean="0"/>
-              <a:t>12/15/2021</a:t>
+              <a:t>6/10/2022</a:t>
             </a:fld>
             <a:endParaRPr lang="en-US"/>
           </a:p>
@@ -4210,7 +4213,7 @@
           <a:p>
             <a:fld id="{4FC59F93-7EE2-4DD2-AA76-4C21107A99A8}" type="datetimeFigureOut">
               <a:rPr lang="en-US" smtClean="0"/>
-              <a:t>12/15/2021</a:t>
+              <a:t>6/10/2022</a:t>
             </a:fld>
             <a:endParaRPr lang="en-US"/>
           </a:p>
@@ -4584,7 +4587,7 @@
           <a:p>
             <a:fld id="{4FC59F93-7EE2-4DD2-AA76-4C21107A99A8}" type="datetimeFigureOut">
               <a:rPr lang="en-US" smtClean="0"/>
-              <a:t>12/15/2021</a:t>
+              <a:t>6/10/2022</a:t>
             </a:fld>
             <a:endParaRPr lang="en-US"/>
           </a:p>
@@ -4707,7 +4710,7 @@
           <a:p>
             <a:fld id="{4FC59F93-7EE2-4DD2-AA76-4C21107A99A8}" type="datetimeFigureOut">
               <a:rPr lang="en-US" smtClean="0"/>
-              <a:t>12/15/2021</a:t>
+              <a:t>6/10/2022</a:t>
             </a:fld>
             <a:endParaRPr lang="en-US"/>
           </a:p>
@@ -4802,7 +4805,7 @@
           <a:p>
             <a:fld id="{4FC59F93-7EE2-4DD2-AA76-4C21107A99A8}" type="datetimeFigureOut">
               <a:rPr lang="en-US" smtClean="0"/>
-              <a:t>12/15/2021</a:t>
+              <a:t>6/10/2022</a:t>
             </a:fld>
             <a:endParaRPr lang="en-US"/>
           </a:p>
@@ -5057,7 +5060,7 @@
           <a:p>
             <a:fld id="{4FC59F93-7EE2-4DD2-AA76-4C21107A99A8}" type="datetimeFigureOut">
               <a:rPr lang="en-US" smtClean="0"/>
-              <a:t>12/15/2021</a:t>
+              <a:t>6/10/2022</a:t>
             </a:fld>
             <a:endParaRPr lang="en-US"/>
           </a:p>
@@ -5320,7 +5323,7 @@
           <a:p>
             <a:fld id="{4FC59F93-7EE2-4DD2-AA76-4C21107A99A8}" type="datetimeFigureOut">
               <a:rPr lang="en-US" smtClean="0"/>
-              <a:t>12/15/2021</a:t>
+              <a:t>6/10/2022</a:t>
             </a:fld>
             <a:endParaRPr lang="en-US"/>
           </a:p>
@@ -6063,7 +6066,7 @@
           <a:p>
             <a:fld id="{4FC59F93-7EE2-4DD2-AA76-4C21107A99A8}" type="datetimeFigureOut">
               <a:rPr lang="en-US" smtClean="0"/>
-              <a:t>12/15/2021</a:t>
+              <a:t>6/10/2022</a:t>
             </a:fld>
             <a:endParaRPr lang="en-US"/>
           </a:p>
@@ -8551,7 +8554,15 @@
             <a:pPr lvl="1"/>
             <a:r>
               <a:rPr lang="en-US" dirty="0"/>
-              <a:t>31 fields for actions required to type the password and the type that the subject takes to complete the action</a:t>
+              <a:t>31 fields for actions required to type the password and </a:t>
+            </a:r>
+            <a:r>
+              <a:rPr lang="en-US"/>
+              <a:t>the time </a:t>
+            </a:r>
+            <a:r>
+              <a:rPr lang="en-US" dirty="0"/>
+              <a:t>that the subject takes to complete the action</a:t>
             </a:r>
           </a:p>
           <a:p>

</xml_diff>

<commit_message>
Created some small updates to powerpoint presentations from stat 601 course.
</commit_message>
<xml_diff>
--- a/R/STAT 601 - Applied Statistics I/Project 4 - Mixed Effects Model Analysis Typing Dynamics/Project 4 Powerpoint - Gavin Gunawardena.pptx
+++ b/R/STAT 601 - Applied Statistics I/Project 4 - Mixed Effects Model Analysis Typing Dynamics/Project 4 Powerpoint - Gavin Gunawardena.pptx
@@ -266,7 +266,7 @@
           <a:p>
             <a:fld id="{684D9C8F-DEEA-405E-AE1B-A74D7D27F3C2}" type="datetimeFigureOut">
               <a:rPr lang="en-US" smtClean="0"/>
-              <a:t>6/10/2022</a:t>
+              <a:t>8/8/2022</a:t>
             </a:fld>
             <a:endParaRPr lang="en-US"/>
           </a:p>
@@ -1595,7 +1595,7 @@
           <a:p>
             <a:fld id="{4FC59F93-7EE2-4DD2-AA76-4C21107A99A8}" type="datetimeFigureOut">
               <a:rPr lang="en-US" smtClean="0"/>
-              <a:t>6/10/2022</a:t>
+              <a:t>8/8/2022</a:t>
             </a:fld>
             <a:endParaRPr lang="en-US"/>
           </a:p>
@@ -1846,7 +1846,7 @@
           <a:p>
             <a:fld id="{4FC59F93-7EE2-4DD2-AA76-4C21107A99A8}" type="datetimeFigureOut">
               <a:rPr lang="en-US" smtClean="0"/>
-              <a:t>6/10/2022</a:t>
+              <a:t>8/8/2022</a:t>
             </a:fld>
             <a:endParaRPr lang="en-US"/>
           </a:p>
@@ -2160,7 +2160,7 @@
           <a:p>
             <a:fld id="{4FC59F93-7EE2-4DD2-AA76-4C21107A99A8}" type="datetimeFigureOut">
               <a:rPr lang="en-US" smtClean="0"/>
-              <a:t>6/10/2022</a:t>
+              <a:t>8/8/2022</a:t>
             </a:fld>
             <a:endParaRPr lang="en-US"/>
           </a:p>
@@ -2501,7 +2501,7 @@
           <a:p>
             <a:fld id="{4FC59F93-7EE2-4DD2-AA76-4C21107A99A8}" type="datetimeFigureOut">
               <a:rPr lang="en-US" smtClean="0"/>
-              <a:t>6/10/2022</a:t>
+              <a:t>8/8/2022</a:t>
             </a:fld>
             <a:endParaRPr lang="en-US"/>
           </a:p>
@@ -2815,7 +2815,7 @@
           <a:p>
             <a:fld id="{4FC59F93-7EE2-4DD2-AA76-4C21107A99A8}" type="datetimeFigureOut">
               <a:rPr lang="en-US" smtClean="0"/>
-              <a:t>6/10/2022</a:t>
+              <a:t>8/8/2022</a:t>
             </a:fld>
             <a:endParaRPr lang="en-US"/>
           </a:p>
@@ -3208,7 +3208,7 @@
           <a:p>
             <a:fld id="{4FC59F93-7EE2-4DD2-AA76-4C21107A99A8}" type="datetimeFigureOut">
               <a:rPr lang="en-US" smtClean="0"/>
-              <a:t>6/10/2022</a:t>
+              <a:t>8/8/2022</a:t>
             </a:fld>
             <a:endParaRPr lang="en-US"/>
           </a:p>
@@ -3378,7 +3378,7 @@
           <a:p>
             <a:fld id="{4FC59F93-7EE2-4DD2-AA76-4C21107A99A8}" type="datetimeFigureOut">
               <a:rPr lang="en-US" smtClean="0"/>
-              <a:t>6/10/2022</a:t>
+              <a:t>8/8/2022</a:t>
             </a:fld>
             <a:endParaRPr lang="en-US"/>
           </a:p>
@@ -3558,7 +3558,7 @@
           <a:p>
             <a:fld id="{4FC59F93-7EE2-4DD2-AA76-4C21107A99A8}" type="datetimeFigureOut">
               <a:rPr lang="en-US" smtClean="0"/>
-              <a:t>6/10/2022</a:t>
+              <a:t>8/8/2022</a:t>
             </a:fld>
             <a:endParaRPr lang="en-US"/>
           </a:p>
@@ -3734,7 +3734,7 @@
           <a:p>
             <a:fld id="{4FC59F93-7EE2-4DD2-AA76-4C21107A99A8}" type="datetimeFigureOut">
               <a:rPr lang="en-US" smtClean="0"/>
-              <a:t>6/10/2022</a:t>
+              <a:t>8/8/2022</a:t>
             </a:fld>
             <a:endParaRPr lang="en-US"/>
           </a:p>
@@ -3981,7 +3981,7 @@
           <a:p>
             <a:fld id="{4FC59F93-7EE2-4DD2-AA76-4C21107A99A8}" type="datetimeFigureOut">
               <a:rPr lang="en-US" smtClean="0"/>
-              <a:t>6/10/2022</a:t>
+              <a:t>8/8/2022</a:t>
             </a:fld>
             <a:endParaRPr lang="en-US"/>
           </a:p>
@@ -4213,7 +4213,7 @@
           <a:p>
             <a:fld id="{4FC59F93-7EE2-4DD2-AA76-4C21107A99A8}" type="datetimeFigureOut">
               <a:rPr lang="en-US" smtClean="0"/>
-              <a:t>6/10/2022</a:t>
+              <a:t>8/8/2022</a:t>
             </a:fld>
             <a:endParaRPr lang="en-US"/>
           </a:p>
@@ -4587,7 +4587,7 @@
           <a:p>
             <a:fld id="{4FC59F93-7EE2-4DD2-AA76-4C21107A99A8}" type="datetimeFigureOut">
               <a:rPr lang="en-US" smtClean="0"/>
-              <a:t>6/10/2022</a:t>
+              <a:t>8/8/2022</a:t>
             </a:fld>
             <a:endParaRPr lang="en-US"/>
           </a:p>
@@ -4710,7 +4710,7 @@
           <a:p>
             <a:fld id="{4FC59F93-7EE2-4DD2-AA76-4C21107A99A8}" type="datetimeFigureOut">
               <a:rPr lang="en-US" smtClean="0"/>
-              <a:t>6/10/2022</a:t>
+              <a:t>8/8/2022</a:t>
             </a:fld>
             <a:endParaRPr lang="en-US"/>
           </a:p>
@@ -4805,7 +4805,7 @@
           <a:p>
             <a:fld id="{4FC59F93-7EE2-4DD2-AA76-4C21107A99A8}" type="datetimeFigureOut">
               <a:rPr lang="en-US" smtClean="0"/>
-              <a:t>6/10/2022</a:t>
+              <a:t>8/8/2022</a:t>
             </a:fld>
             <a:endParaRPr lang="en-US"/>
           </a:p>
@@ -5060,7 +5060,7 @@
           <a:p>
             <a:fld id="{4FC59F93-7EE2-4DD2-AA76-4C21107A99A8}" type="datetimeFigureOut">
               <a:rPr lang="en-US" smtClean="0"/>
-              <a:t>6/10/2022</a:t>
+              <a:t>8/8/2022</a:t>
             </a:fld>
             <a:endParaRPr lang="en-US"/>
           </a:p>
@@ -5323,7 +5323,7 @@
           <a:p>
             <a:fld id="{4FC59F93-7EE2-4DD2-AA76-4C21107A99A8}" type="datetimeFigureOut">
               <a:rPr lang="en-US" smtClean="0"/>
-              <a:t>6/10/2022</a:t>
+              <a:t>8/8/2022</a:t>
             </a:fld>
             <a:endParaRPr lang="en-US"/>
           </a:p>
@@ -6066,7 +6066,7 @@
           <a:p>
             <a:fld id="{4FC59F93-7EE2-4DD2-AA76-4C21107A99A8}" type="datetimeFigureOut">
               <a:rPr lang="en-US" smtClean="0"/>
-              <a:t>6/10/2022</a:t>
+              <a:t>8/8/2022</a:t>
             </a:fld>
             <a:endParaRPr lang="en-US"/>
           </a:p>
@@ -8768,10 +8768,10 @@
       </p:grpSpPr>
       <p:pic>
         <p:nvPicPr>
-          <p:cNvPr id="5" name="Picture 4" descr="Chart, box and whisker chart&#10;&#10;Description automatically generated">
+          <p:cNvPr id="3" name="Picture 2">
             <a:extLst>
               <a:ext uri="{FF2B5EF4-FFF2-40B4-BE49-F238E27FC236}">
-                <a16:creationId xmlns:a16="http://schemas.microsoft.com/office/drawing/2014/main" id="{0D351305-951F-4093-A331-9546A10BCF78}"/>
+                <a16:creationId xmlns:a16="http://schemas.microsoft.com/office/drawing/2014/main" id="{0FBE3B62-7AC7-EE77-ACDB-D69B6A1DE5DE}"/>
               </a:ext>
             </a:extLst>
           </p:cNvPr>
@@ -8788,8 +8788,8 @@
         </p:blipFill>
         <p:spPr>
           <a:xfrm>
-            <a:off x="-1" y="0"/>
-            <a:ext cx="10929083" cy="6858000"/>
+            <a:off x="0" y="0"/>
+            <a:ext cx="10570291" cy="6858000"/>
           </a:xfrm>
           <a:prstGeom prst="rect">
             <a:avLst/>
@@ -8836,10 +8836,10 @@
       </p:grpSpPr>
       <p:pic>
         <p:nvPicPr>
-          <p:cNvPr id="3" name="Picture 2" descr="Chart, box and whisker chart&#10;&#10;Description automatically generated">
+          <p:cNvPr id="6" name="Picture 5">
             <a:extLst>
               <a:ext uri="{FF2B5EF4-FFF2-40B4-BE49-F238E27FC236}">
-                <a16:creationId xmlns:a16="http://schemas.microsoft.com/office/drawing/2014/main" id="{4D77D3CD-400A-428C-96FE-E67F4A3F1F55}"/>
+                <a16:creationId xmlns:a16="http://schemas.microsoft.com/office/drawing/2014/main" id="{8CD4679F-EA58-8270-9CC8-64F6A7711215}"/>
               </a:ext>
             </a:extLst>
           </p:cNvPr>
@@ -8857,7 +8857,7 @@
         <p:spPr>
           <a:xfrm>
             <a:off x="0" y="0"/>
-            <a:ext cx="10799999" cy="6858000"/>
+            <a:ext cx="10242236" cy="6858000"/>
           </a:xfrm>
           <a:prstGeom prst="rect">
             <a:avLst/>

</xml_diff>

<commit_message>
More powerpoint changes to STAT 601 files.
</commit_message>
<xml_diff>
--- a/R/STAT 601 - Applied Statistics I/Project 4 - Mixed Effects Model Analysis Typing Dynamics/Project 4 Powerpoint - Gavin Gunawardena.pptx
+++ b/R/STAT 601 - Applied Statistics I/Project 4 - Mixed Effects Model Analysis Typing Dynamics/Project 4 Powerpoint - Gavin Gunawardena.pptx
@@ -21,8 +21,8 @@
     <p:sldId id="269" r:id="rId12"/>
     <p:sldId id="270" r:id="rId13"/>
     <p:sldId id="260" r:id="rId14"/>
-    <p:sldId id="271" r:id="rId15"/>
-    <p:sldId id="272" r:id="rId16"/>
+    <p:sldId id="272" r:id="rId15"/>
+    <p:sldId id="271" r:id="rId16"/>
     <p:sldId id="261" r:id="rId17"/>
     <p:sldId id="273" r:id="rId18"/>
     <p:sldId id="262" r:id="rId19"/>
@@ -155,8 +155,8 @@
         <p14:section name="Statistical Analysis" id="{CE8592FE-3A39-46F2-95F6-1BABF8E04268}">
           <p14:sldIdLst>
             <p14:sldId id="260"/>
+            <p14:sldId id="272"/>
             <p14:sldId id="271"/>
-            <p14:sldId id="272"/>
           </p14:sldIdLst>
         </p14:section>
         <p14:section name="Post-Hoc Analysis" id="{A7335838-6745-47D9-A583-8C3772CF949C}">
@@ -7234,148 +7234,6 @@
           <p:cNvPr id="2" name="Title 1">
             <a:extLst>
               <a:ext uri="{FF2B5EF4-FFF2-40B4-BE49-F238E27FC236}">
-                <a16:creationId xmlns:a16="http://schemas.microsoft.com/office/drawing/2014/main" id="{BAD3A998-A3B3-4A08-99E4-5B16BDD6806A}"/>
-              </a:ext>
-            </a:extLst>
-          </p:cNvPr>
-          <p:cNvSpPr>
-            <a:spLocks noGrp="1"/>
-          </p:cNvSpPr>
-          <p:nvPr>
-            <p:ph type="title"/>
-          </p:nvPr>
-        </p:nvSpPr>
-        <p:spPr/>
-        <p:txBody>
-          <a:bodyPr/>
-          <a:lstStyle/>
-          <a:p>
-            <a:r>
-              <a:rPr lang="en-US" dirty="0"/>
-              <a:t>Statistical Analysis Results</a:t>
-            </a:r>
-          </a:p>
-        </p:txBody>
-      </p:sp>
-      <p:pic>
-        <p:nvPicPr>
-          <p:cNvPr id="5" name="Content Placeholder 4">
-            <a:extLst>
-              <a:ext uri="{FF2B5EF4-FFF2-40B4-BE49-F238E27FC236}">
-                <a16:creationId xmlns:a16="http://schemas.microsoft.com/office/drawing/2014/main" id="{31B1DBF9-86FA-4ED9-B6F2-C5852D0E7A67}"/>
-              </a:ext>
-            </a:extLst>
-          </p:cNvPr>
-          <p:cNvPicPr>
-            <a:picLocks noGrp="1" noChangeAspect="1"/>
-          </p:cNvPicPr>
-          <p:nvPr>
-            <p:ph idx="1"/>
-          </p:nvPr>
-        </p:nvPicPr>
-        <p:blipFill>
-          <a:blip r:embed="rId2"/>
-          <a:stretch>
-            <a:fillRect/>
-          </a:stretch>
-        </p:blipFill>
-        <p:spPr>
-          <a:xfrm>
-            <a:off x="148474" y="1233905"/>
-            <a:ext cx="11780680" cy="4412916"/>
-          </a:xfrm>
-        </p:spPr>
-      </p:pic>
-      <p:sp>
-        <p:nvSpPr>
-          <p:cNvPr id="6" name="TextBox 5">
-            <a:extLst>
-              <a:ext uri="{FF2B5EF4-FFF2-40B4-BE49-F238E27FC236}">
-                <a16:creationId xmlns:a16="http://schemas.microsoft.com/office/drawing/2014/main" id="{FF3544D2-07E8-42EF-9C79-5D5A44A51FC1}"/>
-              </a:ext>
-            </a:extLst>
-          </p:cNvPr>
-          <p:cNvSpPr txBox="1"/>
-          <p:nvPr/>
-        </p:nvSpPr>
-        <p:spPr>
-          <a:xfrm>
-            <a:off x="677334" y="5887453"/>
-            <a:ext cx="9605655" cy="923330"/>
-          </a:xfrm>
-          <a:prstGeom prst="rect">
-            <a:avLst/>
-          </a:prstGeom>
-          <a:noFill/>
-        </p:spPr>
-        <p:txBody>
-          <a:bodyPr wrap="square" rtlCol="0">
-            <a:spAutoFit/>
-          </a:bodyPr>
-          <a:lstStyle/>
-          <a:p>
-            <a:r>
-              <a:rPr lang="en-US" dirty="0"/>
-              <a:t>Note: *Green represents models that best fit the dataset</a:t>
-            </a:r>
-          </a:p>
-          <a:p>
-            <a:r>
-              <a:rPr lang="en-US" dirty="0"/>
-              <a:t>	   *Fit was measured via residuals charts shown in the next slide as </a:t>
-            </a:r>
-            <a:r>
-              <a:rPr lang="en-US" dirty="0" err="1"/>
-              <a:t>glmmPQL</a:t>
-            </a:r>
-            <a:r>
-              <a:rPr lang="en-US" dirty="0"/>
-              <a:t> does not </a:t>
-            </a:r>
-          </a:p>
-          <a:p>
-            <a:r>
-              <a:rPr lang="en-US" dirty="0"/>
-              <a:t>           output AIC, BIC, or Log likelihood values</a:t>
-            </a:r>
-          </a:p>
-        </p:txBody>
-      </p:sp>
-    </p:spTree>
-    <p:extLst>
-      <p:ext uri="{BB962C8B-B14F-4D97-AF65-F5344CB8AC3E}">
-        <p14:creationId xmlns:p14="http://schemas.microsoft.com/office/powerpoint/2010/main" val="2676552450"/>
-      </p:ext>
-    </p:extLst>
-  </p:cSld>
-  <p:clrMapOvr>
-    <a:masterClrMapping/>
-  </p:clrMapOvr>
-</p:sld>
-</file>
-
-<file path=ppt/slides/slide15.xml><?xml version="1.0" encoding="utf-8"?>
-<p:sld xmlns:a="http://schemas.openxmlformats.org/drawingml/2006/main" xmlns:r="http://schemas.openxmlformats.org/officeDocument/2006/relationships" xmlns:p="http://schemas.openxmlformats.org/presentationml/2006/main">
-  <p:cSld>
-    <p:spTree>
-      <p:nvGrpSpPr>
-        <p:cNvPr id="1" name=""/>
-        <p:cNvGrpSpPr/>
-        <p:nvPr/>
-      </p:nvGrpSpPr>
-      <p:grpSpPr>
-        <a:xfrm>
-          <a:off x="0" y="0"/>
-          <a:ext cx="0" cy="0"/>
-          <a:chOff x="0" y="0"/>
-          <a:chExt cx="0" cy="0"/>
-        </a:xfrm>
-      </p:grpSpPr>
-      <p:sp>
-        <p:nvSpPr>
-          <p:cNvPr id="2" name="Title 1">
-            <a:extLst>
-              <a:ext uri="{FF2B5EF4-FFF2-40B4-BE49-F238E27FC236}">
                 <a16:creationId xmlns:a16="http://schemas.microsoft.com/office/drawing/2014/main" id="{797751BA-FC47-46D5-96B2-5ABB3B9EF9A8}"/>
               </a:ext>
             </a:extLst>
@@ -7528,6 +7386,150 @@
     <p:extLst>
       <p:ext uri="{BB962C8B-B14F-4D97-AF65-F5344CB8AC3E}">
         <p14:creationId xmlns:p14="http://schemas.microsoft.com/office/powerpoint/2010/main" val="1679924346"/>
+      </p:ext>
+    </p:extLst>
+  </p:cSld>
+  <p:clrMapOvr>
+    <a:masterClrMapping/>
+  </p:clrMapOvr>
+</p:sld>
+</file>
+
+<file path=ppt/slides/slide15.xml><?xml version="1.0" encoding="utf-8"?>
+<p:sld xmlns:a="http://schemas.openxmlformats.org/drawingml/2006/main" xmlns:r="http://schemas.openxmlformats.org/officeDocument/2006/relationships" xmlns:p="http://schemas.openxmlformats.org/presentationml/2006/main">
+  <p:cSld>
+    <p:spTree>
+      <p:nvGrpSpPr>
+        <p:cNvPr id="1" name=""/>
+        <p:cNvGrpSpPr/>
+        <p:nvPr/>
+      </p:nvGrpSpPr>
+      <p:grpSpPr>
+        <a:xfrm>
+          <a:off x="0" y="0"/>
+          <a:ext cx="0" cy="0"/>
+          <a:chOff x="0" y="0"/>
+          <a:chExt cx="0" cy="0"/>
+        </a:xfrm>
+      </p:grpSpPr>
+      <p:sp>
+        <p:nvSpPr>
+          <p:cNvPr id="2" name="Title 1">
+            <a:extLst>
+              <a:ext uri="{FF2B5EF4-FFF2-40B4-BE49-F238E27FC236}">
+                <a16:creationId xmlns:a16="http://schemas.microsoft.com/office/drawing/2014/main" id="{BAD3A998-A3B3-4A08-99E4-5B16BDD6806A}"/>
+              </a:ext>
+            </a:extLst>
+          </p:cNvPr>
+          <p:cNvSpPr>
+            <a:spLocks noGrp="1"/>
+          </p:cNvSpPr>
+          <p:nvPr>
+            <p:ph type="title"/>
+          </p:nvPr>
+        </p:nvSpPr>
+        <p:spPr/>
+        <p:txBody>
+          <a:bodyPr/>
+          <a:lstStyle/>
+          <a:p>
+            <a:r>
+              <a:rPr lang="en-US" dirty="0"/>
+              <a:t>Statistical Analysis Results</a:t>
+            </a:r>
+          </a:p>
+        </p:txBody>
+      </p:sp>
+      <p:pic>
+        <p:nvPicPr>
+          <p:cNvPr id="5" name="Content Placeholder 4">
+            <a:extLst>
+              <a:ext uri="{FF2B5EF4-FFF2-40B4-BE49-F238E27FC236}">
+                <a16:creationId xmlns:a16="http://schemas.microsoft.com/office/drawing/2014/main" id="{31B1DBF9-86FA-4ED9-B6F2-C5852D0E7A67}"/>
+              </a:ext>
+            </a:extLst>
+          </p:cNvPr>
+          <p:cNvPicPr>
+            <a:picLocks noGrp="1" noChangeAspect="1"/>
+          </p:cNvPicPr>
+          <p:nvPr>
+            <p:ph idx="1"/>
+          </p:nvPr>
+        </p:nvPicPr>
+        <p:blipFill>
+          <a:blip r:embed="rId2"/>
+          <a:stretch>
+            <a:fillRect/>
+          </a:stretch>
+        </p:blipFill>
+        <p:spPr>
+          <a:xfrm>
+            <a:off x="148474" y="1233905"/>
+            <a:ext cx="11780680" cy="4412916"/>
+          </a:xfrm>
+        </p:spPr>
+      </p:pic>
+      <p:sp>
+        <p:nvSpPr>
+          <p:cNvPr id="6" name="TextBox 5">
+            <a:extLst>
+              <a:ext uri="{FF2B5EF4-FFF2-40B4-BE49-F238E27FC236}">
+                <a16:creationId xmlns:a16="http://schemas.microsoft.com/office/drawing/2014/main" id="{FF3544D2-07E8-42EF-9C79-5D5A44A51FC1}"/>
+              </a:ext>
+            </a:extLst>
+          </p:cNvPr>
+          <p:cNvSpPr txBox="1"/>
+          <p:nvPr/>
+        </p:nvSpPr>
+        <p:spPr>
+          <a:xfrm>
+            <a:off x="677334" y="5887453"/>
+            <a:ext cx="9605655" cy="923330"/>
+          </a:xfrm>
+          <a:prstGeom prst="rect">
+            <a:avLst/>
+          </a:prstGeom>
+          <a:noFill/>
+        </p:spPr>
+        <p:txBody>
+          <a:bodyPr wrap="square" rtlCol="0">
+            <a:spAutoFit/>
+          </a:bodyPr>
+          <a:lstStyle/>
+          <a:p>
+            <a:r>
+              <a:rPr lang="en-US" dirty="0"/>
+              <a:t>Note: *Green represents models that best fit the dataset</a:t>
+            </a:r>
+          </a:p>
+          <a:p>
+            <a:r>
+              <a:rPr lang="en-US" dirty="0"/>
+              <a:t>	   *Fit was measured via residuals charts shown in the previous slide as </a:t>
+            </a:r>
+            <a:r>
+              <a:rPr lang="en-US" dirty="0" err="1"/>
+              <a:t>glmmPQL</a:t>
+            </a:r>
+            <a:r>
+              <a:rPr lang="en-US" dirty="0"/>
+              <a:t> does 	    </a:t>
+            </a:r>
+            <a:r>
+              <a:rPr lang="en-US"/>
+              <a:t>not output </a:t>
+            </a:r>
+            <a:r>
+              <a:rPr lang="en-US" dirty="0"/>
+              <a:t>AIC, BIC, or Log likelihood values</a:t>
+            </a:r>
+          </a:p>
+        </p:txBody>
+      </p:sp>
+    </p:spTree>
+    <p:extLst>
+      <p:ext uri="{BB962C8B-B14F-4D97-AF65-F5344CB8AC3E}">
+        <p14:creationId xmlns:p14="http://schemas.microsoft.com/office/powerpoint/2010/main" val="2676552450"/>
       </p:ext>
     </p:extLst>
   </p:cSld>

</xml_diff>

<commit_message>
Updates to powerpoint presentations.
</commit_message>
<xml_diff>
--- a/R/STAT 601 - Applied Statistics I/Project 4 - Mixed Effects Model Analysis Typing Dynamics/Project 4 Powerpoint - Gavin Gunawardena.pptx
+++ b/R/STAT 601 - Applied Statistics I/Project 4 - Mixed Effects Model Analysis Typing Dynamics/Project 4 Powerpoint - Gavin Gunawardena.pptx
@@ -7926,7 +7926,23 @@
             <a:pPr lvl="1"/>
             <a:r>
               <a:rPr lang="en-US" sz="1800" dirty="0"/>
-              <a:t>The change is by about -0.19 per session and -.01 per repetition</a:t>
+              <a:t>The change is by about </a:t>
+            </a:r>
+            <a:r>
+              <a:rPr lang="en-US" sz="1800"/>
+              <a:t>-0.19 seconds </a:t>
+            </a:r>
+            <a:r>
+              <a:rPr lang="en-US" sz="1800" dirty="0"/>
+              <a:t>per session and </a:t>
+            </a:r>
+            <a:r>
+              <a:rPr lang="en-US" sz="1800"/>
+              <a:t>-.01 seconds </a:t>
+            </a:r>
+            <a:r>
+              <a:rPr lang="en-US" sz="1800" dirty="0"/>
+              <a:t>per repetition</a:t>
             </a:r>
           </a:p>
           <a:p>
@@ -8898,10 +8914,10 @@
       </p:grpSpPr>
       <p:pic>
         <p:nvPicPr>
-          <p:cNvPr id="3" name="Picture 2">
+          <p:cNvPr id="4" name="Picture 3">
             <a:extLst>
               <a:ext uri="{FF2B5EF4-FFF2-40B4-BE49-F238E27FC236}">
-                <a16:creationId xmlns:a16="http://schemas.microsoft.com/office/drawing/2014/main" id="{EB5D5070-66B7-438E-B760-371FADD55F6B}"/>
+                <a16:creationId xmlns:a16="http://schemas.microsoft.com/office/drawing/2014/main" id="{D30BF2F5-46FC-F3BA-8130-543448D4EFAB}"/>
               </a:ext>
             </a:extLst>
           </p:cNvPr>
@@ -8919,7 +8935,7 @@
         <p:spPr>
           <a:xfrm>
             <a:off x="0" y="0"/>
-            <a:ext cx="10359958" cy="6858000"/>
+            <a:ext cx="10420945" cy="6858000"/>
           </a:xfrm>
           <a:prstGeom prst="rect">
             <a:avLst/>

</xml_diff>

<commit_message>
Text update to STAT 601 mixed effects model project powerpoint text.
</commit_message>
<xml_diff>
--- a/R/STAT 601 - Applied Statistics I/Project 4 - Mixed Effects Model Analysis Typing Dynamics/Project 4 Powerpoint - Gavin Gunawardena.pptx
+++ b/R/STAT 601 - Applied Statistics I/Project 4 - Mixed Effects Model Analysis Typing Dynamics/Project 4 Powerpoint - Gavin Gunawardena.pptx
@@ -266,7 +266,7 @@
           <a:p>
             <a:fld id="{684D9C8F-DEEA-405E-AE1B-A74D7D27F3C2}" type="datetimeFigureOut">
               <a:rPr lang="en-US" smtClean="0"/>
-              <a:t>8/8/2022</a:t>
+              <a:t>1/31/2023</a:t>
             </a:fld>
             <a:endParaRPr lang="en-US"/>
           </a:p>
@@ -1595,7 +1595,7 @@
           <a:p>
             <a:fld id="{4FC59F93-7EE2-4DD2-AA76-4C21107A99A8}" type="datetimeFigureOut">
               <a:rPr lang="en-US" smtClean="0"/>
-              <a:t>8/8/2022</a:t>
+              <a:t>1/31/2023</a:t>
             </a:fld>
             <a:endParaRPr lang="en-US"/>
           </a:p>
@@ -1846,7 +1846,7 @@
           <a:p>
             <a:fld id="{4FC59F93-7EE2-4DD2-AA76-4C21107A99A8}" type="datetimeFigureOut">
               <a:rPr lang="en-US" smtClean="0"/>
-              <a:t>8/8/2022</a:t>
+              <a:t>1/31/2023</a:t>
             </a:fld>
             <a:endParaRPr lang="en-US"/>
           </a:p>
@@ -2160,7 +2160,7 @@
           <a:p>
             <a:fld id="{4FC59F93-7EE2-4DD2-AA76-4C21107A99A8}" type="datetimeFigureOut">
               <a:rPr lang="en-US" smtClean="0"/>
-              <a:t>8/8/2022</a:t>
+              <a:t>1/31/2023</a:t>
             </a:fld>
             <a:endParaRPr lang="en-US"/>
           </a:p>
@@ -2501,7 +2501,7 @@
           <a:p>
             <a:fld id="{4FC59F93-7EE2-4DD2-AA76-4C21107A99A8}" type="datetimeFigureOut">
               <a:rPr lang="en-US" smtClean="0"/>
-              <a:t>8/8/2022</a:t>
+              <a:t>1/31/2023</a:t>
             </a:fld>
             <a:endParaRPr lang="en-US"/>
           </a:p>
@@ -2815,7 +2815,7 @@
           <a:p>
             <a:fld id="{4FC59F93-7EE2-4DD2-AA76-4C21107A99A8}" type="datetimeFigureOut">
               <a:rPr lang="en-US" smtClean="0"/>
-              <a:t>8/8/2022</a:t>
+              <a:t>1/31/2023</a:t>
             </a:fld>
             <a:endParaRPr lang="en-US"/>
           </a:p>
@@ -3208,7 +3208,7 @@
           <a:p>
             <a:fld id="{4FC59F93-7EE2-4DD2-AA76-4C21107A99A8}" type="datetimeFigureOut">
               <a:rPr lang="en-US" smtClean="0"/>
-              <a:t>8/8/2022</a:t>
+              <a:t>1/31/2023</a:t>
             </a:fld>
             <a:endParaRPr lang="en-US"/>
           </a:p>
@@ -3378,7 +3378,7 @@
           <a:p>
             <a:fld id="{4FC59F93-7EE2-4DD2-AA76-4C21107A99A8}" type="datetimeFigureOut">
               <a:rPr lang="en-US" smtClean="0"/>
-              <a:t>8/8/2022</a:t>
+              <a:t>1/31/2023</a:t>
             </a:fld>
             <a:endParaRPr lang="en-US"/>
           </a:p>
@@ -3558,7 +3558,7 @@
           <a:p>
             <a:fld id="{4FC59F93-7EE2-4DD2-AA76-4C21107A99A8}" type="datetimeFigureOut">
               <a:rPr lang="en-US" smtClean="0"/>
-              <a:t>8/8/2022</a:t>
+              <a:t>1/31/2023</a:t>
             </a:fld>
             <a:endParaRPr lang="en-US"/>
           </a:p>
@@ -3734,7 +3734,7 @@
           <a:p>
             <a:fld id="{4FC59F93-7EE2-4DD2-AA76-4C21107A99A8}" type="datetimeFigureOut">
               <a:rPr lang="en-US" smtClean="0"/>
-              <a:t>8/8/2022</a:t>
+              <a:t>1/31/2023</a:t>
             </a:fld>
             <a:endParaRPr lang="en-US"/>
           </a:p>
@@ -3981,7 +3981,7 @@
           <a:p>
             <a:fld id="{4FC59F93-7EE2-4DD2-AA76-4C21107A99A8}" type="datetimeFigureOut">
               <a:rPr lang="en-US" smtClean="0"/>
-              <a:t>8/8/2022</a:t>
+              <a:t>1/31/2023</a:t>
             </a:fld>
             <a:endParaRPr lang="en-US"/>
           </a:p>
@@ -4213,7 +4213,7 @@
           <a:p>
             <a:fld id="{4FC59F93-7EE2-4DD2-AA76-4C21107A99A8}" type="datetimeFigureOut">
               <a:rPr lang="en-US" smtClean="0"/>
-              <a:t>8/8/2022</a:t>
+              <a:t>1/31/2023</a:t>
             </a:fld>
             <a:endParaRPr lang="en-US"/>
           </a:p>
@@ -4587,7 +4587,7 @@
           <a:p>
             <a:fld id="{4FC59F93-7EE2-4DD2-AA76-4C21107A99A8}" type="datetimeFigureOut">
               <a:rPr lang="en-US" smtClean="0"/>
-              <a:t>8/8/2022</a:t>
+              <a:t>1/31/2023</a:t>
             </a:fld>
             <a:endParaRPr lang="en-US"/>
           </a:p>
@@ -4710,7 +4710,7 @@
           <a:p>
             <a:fld id="{4FC59F93-7EE2-4DD2-AA76-4C21107A99A8}" type="datetimeFigureOut">
               <a:rPr lang="en-US" smtClean="0"/>
-              <a:t>8/8/2022</a:t>
+              <a:t>1/31/2023</a:t>
             </a:fld>
             <a:endParaRPr lang="en-US"/>
           </a:p>
@@ -4805,7 +4805,7 @@
           <a:p>
             <a:fld id="{4FC59F93-7EE2-4DD2-AA76-4C21107A99A8}" type="datetimeFigureOut">
               <a:rPr lang="en-US" smtClean="0"/>
-              <a:t>8/8/2022</a:t>
+              <a:t>1/31/2023</a:t>
             </a:fld>
             <a:endParaRPr lang="en-US"/>
           </a:p>
@@ -5060,7 +5060,7 @@
           <a:p>
             <a:fld id="{4FC59F93-7EE2-4DD2-AA76-4C21107A99A8}" type="datetimeFigureOut">
               <a:rPr lang="en-US" smtClean="0"/>
-              <a:t>8/8/2022</a:t>
+              <a:t>1/31/2023</a:t>
             </a:fld>
             <a:endParaRPr lang="en-US"/>
           </a:p>
@@ -5323,7 +5323,7 @@
           <a:p>
             <a:fld id="{4FC59F93-7EE2-4DD2-AA76-4C21107A99A8}" type="datetimeFigureOut">
               <a:rPr lang="en-US" smtClean="0"/>
-              <a:t>8/8/2022</a:t>
+              <a:t>1/31/2023</a:t>
             </a:fld>
             <a:endParaRPr lang="en-US"/>
           </a:p>
@@ -6066,7 +6066,7 @@
           <a:p>
             <a:fld id="{4FC59F93-7EE2-4DD2-AA76-4C21107A99A8}" type="datetimeFigureOut">
               <a:rPr lang="en-US" smtClean="0"/>
-              <a:t>8/8/2022</a:t>
+              <a:t>1/31/2023</a:t>
             </a:fld>
             <a:endParaRPr lang="en-US"/>
           </a:p>
@@ -9140,40 +9140,157 @@
             <p:ph idx="1"/>
           </p:nvPr>
         </p:nvSpPr>
-        <p:spPr/>
-        <p:txBody>
-          <a:bodyPr/>
+        <p:spPr>
+          <a:xfrm>
+            <a:off x="677334" y="1930400"/>
+            <a:ext cx="8596668" cy="4404412"/>
+          </a:xfrm>
+        </p:spPr>
+        <p:txBody>
+          <a:bodyPr>
+            <a:normAutofit fontScale="92500" lnSpcReduction="20000"/>
+          </a:bodyPr>
           <a:lstStyle/>
           <a:p>
             <a:r>
+              <a:rPr lang="en-US" sz="2200" dirty="0"/>
+              <a:t>Models and techniques that will be used</a:t>
+            </a:r>
+          </a:p>
+          <a:p>
+            <a:pPr lvl="1"/>
+            <a:r>
+              <a:rPr lang="en-US" sz="1900" dirty="0"/>
+              <a:t>Random Intercept Model</a:t>
+            </a:r>
+          </a:p>
+          <a:p>
+            <a:pPr lvl="2"/>
+            <a:r>
+              <a:rPr lang="en-US" sz="1700" dirty="0">
+                <a:solidFill>
+                  <a:srgbClr val="000000"/>
+                </a:solidFill>
+                <a:latin typeface="Calibri" panose="020F0502020204030204" pitchFamily="34" charset="0"/>
+              </a:rPr>
+              <a:t>C</a:t>
+            </a:r>
+            <a:r>
+              <a:rPr lang="en-US" sz="1700" b="0" i="0" dirty="0">
+                <a:solidFill>
+                  <a:srgbClr val="000000"/>
+                </a:solidFill>
+                <a:effectLst/>
+                <a:latin typeface="Calibri" panose="020F0502020204030204" pitchFamily="34" charset="0"/>
+              </a:rPr>
+              <a:t>ommonly used as opposed to generalized linear models for datasets with repeated measurements</a:t>
+            </a:r>
+            <a:r>
+              <a:rPr lang="en-US" sz="1700" dirty="0"/>
+              <a:t> </a:t>
+            </a:r>
+          </a:p>
+          <a:p>
+            <a:pPr lvl="2"/>
+            <a:r>
+              <a:rPr lang="en-US" sz="1700" dirty="0">
+                <a:solidFill>
+                  <a:srgbClr val="000000"/>
+                </a:solidFill>
+                <a:latin typeface="Calibri" panose="020F0502020204030204" pitchFamily="34" charset="0"/>
+              </a:rPr>
+              <a:t>A</a:t>
+            </a:r>
+            <a:r>
+              <a:rPr lang="en-US" sz="1700" b="0" i="0" dirty="0">
+                <a:solidFill>
+                  <a:srgbClr val="000000"/>
+                </a:solidFill>
+                <a:effectLst/>
+                <a:latin typeface="Calibri" panose="020F0502020204030204" pitchFamily="34" charset="0"/>
+              </a:rPr>
+              <a:t>ssumes that correlation amongst independent repeated measurements on the same unit arises from the shared unobserved variables and that time has a fixed effect</a:t>
+            </a:r>
+            <a:r>
+              <a:rPr lang="en-US" sz="1700" dirty="0"/>
+              <a:t> </a:t>
+            </a:r>
+          </a:p>
+          <a:p>
+            <a:pPr lvl="2"/>
+            <a:r>
+              <a:rPr lang="en-US" sz="1700" dirty="0">
+                <a:solidFill>
+                  <a:srgbClr val="000000"/>
+                </a:solidFill>
+                <a:latin typeface="Calibri" panose="020F0502020204030204" pitchFamily="34" charset="0"/>
+              </a:rPr>
+              <a:t>Measures dissimilarity in intercepts</a:t>
+            </a:r>
+          </a:p>
+          <a:p>
+            <a:pPr lvl="1"/>
+            <a:r>
+              <a:rPr lang="en-US" sz="1900" dirty="0"/>
+              <a:t>Random Intercept and Slope Model</a:t>
+            </a:r>
+          </a:p>
+          <a:p>
+            <a:pPr lvl="2"/>
+            <a:r>
+              <a:rPr lang="en-US" sz="1700" dirty="0">
+                <a:solidFill>
+                  <a:srgbClr val="000000"/>
+                </a:solidFill>
+                <a:latin typeface="Calibri" panose="020F0502020204030204" pitchFamily="34" charset="0"/>
+              </a:rPr>
+              <a:t>Similar to random intercept models but measures  dissimilarity in intercepts and slopes</a:t>
+            </a:r>
+          </a:p>
+          <a:p>
+            <a:pPr lvl="1"/>
+            <a:r>
+              <a:rPr lang="en-US" sz="1900" dirty="0"/>
+              <a:t>Penalized </a:t>
+            </a:r>
+            <a:r>
+              <a:rPr lang="en-US" sz="1900" dirty="0" err="1"/>
+              <a:t>Quasilikelihood</a:t>
+            </a:r>
+            <a:endParaRPr lang="en-US" sz="1900" dirty="0"/>
+          </a:p>
+          <a:p>
+            <a:pPr lvl="2"/>
+            <a:r>
+              <a:rPr lang="en-US" sz="1700" b="0" i="0" dirty="0">
+                <a:solidFill>
+                  <a:srgbClr val="000000"/>
+                </a:solidFill>
+                <a:effectLst/>
+                <a:latin typeface="Calibri" panose="020F0502020204030204" pitchFamily="34" charset="0"/>
+              </a:rPr>
+              <a:t>This technique allows for the fitting of data to mixed effect models when the data is not of a normal distribution. </a:t>
+            </a:r>
+          </a:p>
+          <a:p>
+            <a:pPr lvl="2"/>
+            <a:r>
+              <a:rPr lang="en-US" sz="1700" b="0" i="0" dirty="0">
+                <a:solidFill>
+                  <a:srgbClr val="000000"/>
+                </a:solidFill>
+                <a:effectLst/>
+                <a:latin typeface="Calibri" panose="020F0502020204030204" pitchFamily="34" charset="0"/>
+              </a:rPr>
+              <a:t>It is an approximate inference technique that allows estimation of model parameters without knowledge of the error distribution of the response variable.</a:t>
+            </a:r>
+            <a:r>
+              <a:rPr lang="en-US" sz="1700" dirty="0"/>
+              <a:t> </a:t>
+            </a:r>
+            <a:br>
               <a:rPr lang="en-US" dirty="0"/>
-              <a:t>Explanation of models and techniques that will be used</a:t>
-            </a:r>
-          </a:p>
-          <a:p>
-            <a:pPr lvl="1"/>
-            <a:r>
-              <a:rPr lang="en-US" dirty="0"/>
-              <a:t>Random Intercept Model</a:t>
-            </a:r>
-          </a:p>
-          <a:p>
-            <a:pPr lvl="1"/>
-            <a:r>
-              <a:rPr lang="en-US" dirty="0"/>
-              <a:t>Random Intercept and Slope Model</a:t>
-            </a:r>
-          </a:p>
-          <a:p>
-            <a:pPr lvl="1"/>
-            <a:r>
-              <a:rPr lang="en-US" dirty="0"/>
-              <a:t>Penalized </a:t>
-            </a:r>
-            <a:r>
-              <a:rPr lang="en-US" dirty="0" err="1"/>
-              <a:t>Quasilikelihood</a:t>
-            </a:r>
+            </a:br>
             <a:endParaRPr lang="en-US" dirty="0"/>
           </a:p>
         </p:txBody>

</xml_diff>

<commit_message>
Updated STAT 601 Mixed Effects Models project to correct issue of misnaming of source material.
</commit_message>
<xml_diff>
--- a/R/STAT 601 - Applied Statistics I/Project 4 - Mixed Effects Model Analysis Typing Dynamics/Project 4 Powerpoint - Gavin Gunawardena.pptx
+++ b/R/STAT 601 - Applied Statistics I/Project 4 - Mixed Effects Model Analysis Typing Dynamics/Project 4 Powerpoint - Gavin Gunawardena.pptx
@@ -266,7 +266,7 @@
           <a:p>
             <a:fld id="{684D9C8F-DEEA-405E-AE1B-A74D7D27F3C2}" type="datetimeFigureOut">
               <a:rPr lang="en-US" smtClean="0"/>
-              <a:t>1/31/2023</a:t>
+              <a:t>10/9/2023</a:t>
             </a:fld>
             <a:endParaRPr lang="en-US"/>
           </a:p>
@@ -1595,7 +1595,7 @@
           <a:p>
             <a:fld id="{4FC59F93-7EE2-4DD2-AA76-4C21107A99A8}" type="datetimeFigureOut">
               <a:rPr lang="en-US" smtClean="0"/>
-              <a:t>1/31/2023</a:t>
+              <a:t>10/9/2023</a:t>
             </a:fld>
             <a:endParaRPr lang="en-US"/>
           </a:p>
@@ -1846,7 +1846,7 @@
           <a:p>
             <a:fld id="{4FC59F93-7EE2-4DD2-AA76-4C21107A99A8}" type="datetimeFigureOut">
               <a:rPr lang="en-US" smtClean="0"/>
-              <a:t>1/31/2023</a:t>
+              <a:t>10/9/2023</a:t>
             </a:fld>
             <a:endParaRPr lang="en-US"/>
           </a:p>
@@ -2160,7 +2160,7 @@
           <a:p>
             <a:fld id="{4FC59F93-7EE2-4DD2-AA76-4C21107A99A8}" type="datetimeFigureOut">
               <a:rPr lang="en-US" smtClean="0"/>
-              <a:t>1/31/2023</a:t>
+              <a:t>10/9/2023</a:t>
             </a:fld>
             <a:endParaRPr lang="en-US"/>
           </a:p>
@@ -2501,7 +2501,7 @@
           <a:p>
             <a:fld id="{4FC59F93-7EE2-4DD2-AA76-4C21107A99A8}" type="datetimeFigureOut">
               <a:rPr lang="en-US" smtClean="0"/>
-              <a:t>1/31/2023</a:t>
+              <a:t>10/9/2023</a:t>
             </a:fld>
             <a:endParaRPr lang="en-US"/>
           </a:p>
@@ -2815,7 +2815,7 @@
           <a:p>
             <a:fld id="{4FC59F93-7EE2-4DD2-AA76-4C21107A99A8}" type="datetimeFigureOut">
               <a:rPr lang="en-US" smtClean="0"/>
-              <a:t>1/31/2023</a:t>
+              <a:t>10/9/2023</a:t>
             </a:fld>
             <a:endParaRPr lang="en-US"/>
           </a:p>
@@ -3208,7 +3208,7 @@
           <a:p>
             <a:fld id="{4FC59F93-7EE2-4DD2-AA76-4C21107A99A8}" type="datetimeFigureOut">
               <a:rPr lang="en-US" smtClean="0"/>
-              <a:t>1/31/2023</a:t>
+              <a:t>10/9/2023</a:t>
             </a:fld>
             <a:endParaRPr lang="en-US"/>
           </a:p>
@@ -3378,7 +3378,7 @@
           <a:p>
             <a:fld id="{4FC59F93-7EE2-4DD2-AA76-4C21107A99A8}" type="datetimeFigureOut">
               <a:rPr lang="en-US" smtClean="0"/>
-              <a:t>1/31/2023</a:t>
+              <a:t>10/9/2023</a:t>
             </a:fld>
             <a:endParaRPr lang="en-US"/>
           </a:p>
@@ -3558,7 +3558,7 @@
           <a:p>
             <a:fld id="{4FC59F93-7EE2-4DD2-AA76-4C21107A99A8}" type="datetimeFigureOut">
               <a:rPr lang="en-US" smtClean="0"/>
-              <a:t>1/31/2023</a:t>
+              <a:t>10/9/2023</a:t>
             </a:fld>
             <a:endParaRPr lang="en-US"/>
           </a:p>
@@ -3734,7 +3734,7 @@
           <a:p>
             <a:fld id="{4FC59F93-7EE2-4DD2-AA76-4C21107A99A8}" type="datetimeFigureOut">
               <a:rPr lang="en-US" smtClean="0"/>
-              <a:t>1/31/2023</a:t>
+              <a:t>10/9/2023</a:t>
             </a:fld>
             <a:endParaRPr lang="en-US"/>
           </a:p>
@@ -3981,7 +3981,7 @@
           <a:p>
             <a:fld id="{4FC59F93-7EE2-4DD2-AA76-4C21107A99A8}" type="datetimeFigureOut">
               <a:rPr lang="en-US" smtClean="0"/>
-              <a:t>1/31/2023</a:t>
+              <a:t>10/9/2023</a:t>
             </a:fld>
             <a:endParaRPr lang="en-US"/>
           </a:p>
@@ -4213,7 +4213,7 @@
           <a:p>
             <a:fld id="{4FC59F93-7EE2-4DD2-AA76-4C21107A99A8}" type="datetimeFigureOut">
               <a:rPr lang="en-US" smtClean="0"/>
-              <a:t>1/31/2023</a:t>
+              <a:t>10/9/2023</a:t>
             </a:fld>
             <a:endParaRPr lang="en-US"/>
           </a:p>
@@ -4587,7 +4587,7 @@
           <a:p>
             <a:fld id="{4FC59F93-7EE2-4DD2-AA76-4C21107A99A8}" type="datetimeFigureOut">
               <a:rPr lang="en-US" smtClean="0"/>
-              <a:t>1/31/2023</a:t>
+              <a:t>10/9/2023</a:t>
             </a:fld>
             <a:endParaRPr lang="en-US"/>
           </a:p>
@@ -4710,7 +4710,7 @@
           <a:p>
             <a:fld id="{4FC59F93-7EE2-4DD2-AA76-4C21107A99A8}" type="datetimeFigureOut">
               <a:rPr lang="en-US" smtClean="0"/>
-              <a:t>1/31/2023</a:t>
+              <a:t>10/9/2023</a:t>
             </a:fld>
             <a:endParaRPr lang="en-US"/>
           </a:p>
@@ -4805,7 +4805,7 @@
           <a:p>
             <a:fld id="{4FC59F93-7EE2-4DD2-AA76-4C21107A99A8}" type="datetimeFigureOut">
               <a:rPr lang="en-US" smtClean="0"/>
-              <a:t>1/31/2023</a:t>
+              <a:t>10/9/2023</a:t>
             </a:fld>
             <a:endParaRPr lang="en-US"/>
           </a:p>
@@ -5060,7 +5060,7 @@
           <a:p>
             <a:fld id="{4FC59F93-7EE2-4DD2-AA76-4C21107A99A8}" type="datetimeFigureOut">
               <a:rPr lang="en-US" smtClean="0"/>
-              <a:t>1/31/2023</a:t>
+              <a:t>10/9/2023</a:t>
             </a:fld>
             <a:endParaRPr lang="en-US"/>
           </a:p>
@@ -5323,7 +5323,7 @@
           <a:p>
             <a:fld id="{4FC59F93-7EE2-4DD2-AA76-4C21107A99A8}" type="datetimeFigureOut">
               <a:rPr lang="en-US" smtClean="0"/>
-              <a:t>1/31/2023</a:t>
+              <a:t>10/9/2023</a:t>
             </a:fld>
             <a:endParaRPr lang="en-US"/>
           </a:p>
@@ -6066,7 +6066,7 @@
           <a:p>
             <a:fld id="{4FC59F93-7EE2-4DD2-AA76-4C21107A99A8}" type="datetimeFigureOut">
               <a:rPr lang="en-US" smtClean="0"/>
-              <a:t>1/31/2023</a:t>
+              <a:t>10/9/2023</a:t>
             </a:fld>
             <a:endParaRPr lang="en-US"/>
           </a:p>
@@ -6663,9 +6663,36 @@
           </a:p>
           <a:p>
             <a:r>
+              <a:rPr lang="en-US" altLang="en-US" sz="2000" dirty="0">
+                <a:solidFill>
+                  <a:schemeClr val="tx1">
+                    <a:lumMod val="75000"/>
+                    <a:lumOff val="25000"/>
+                  </a:schemeClr>
+                </a:solidFill>
+                <a:latin typeface="+mn-lt"/>
+              </a:rPr>
+              <a:t>Comparing Anomaly-Detection Algorithms for Keystroke Dynamics  </a:t>
+            </a:r>
+            <a:r>
               <a:rPr lang="en-US" sz="2000" dirty="0"/>
-              <a:t>Utilizing a dataset from Estimating Whether People’s Typing Dynamics Change Over Time by Carnegie Melon University School of Computer Science</a:t>
-            </a:r>
+              <a:t>by Carnegie Melon University School of Computer Science </a:t>
+            </a:r>
+            <a:r>
+              <a:rPr lang="en-US" altLang="en-US" sz="2000" dirty="0">
+                <a:solidFill>
+                  <a:schemeClr val="tx1">
+                    <a:lumMod val="75000"/>
+                    <a:lumOff val="25000"/>
+                  </a:schemeClr>
+                </a:solidFill>
+                <a:latin typeface="+mn-lt"/>
+              </a:rPr>
+              <a:t>https://www.cs.cmu.edu/~keystroke/KillourhyMaxion09.pdf</a:t>
+            </a:r>
+          </a:p>
+          <a:p>
+            <a:endParaRPr lang="en-US" sz="2000" dirty="0"/>
           </a:p>
         </p:txBody>
       </p:sp>
@@ -8035,8 +8062,8 @@
         </p:nvSpPr>
         <p:spPr bwMode="auto">
           <a:xfrm>
-            <a:off x="677334" y="1305350"/>
-            <a:ext cx="8700130" cy="5591274"/>
+            <a:off x="677334" y="1443849"/>
+            <a:ext cx="8700130" cy="5314275"/>
           </a:xfrm>
           <a:prstGeom prst="rect">
             <a:avLst/>
@@ -8321,7 +8348,7 @@
                 </a:solidFill>
                 <a:latin typeface="+mn-lt"/>
               </a:rPr>
-              <a:t>https://www.cs.cmu.edu/~keystroke/KillourhyMaxion09.pdf. (2009). Comparing Anomaly-Detection Algorithms for Keystroke Dynamics. Retrieved from Carnegie Melon University School of Computer Science: https://www.cs.cmu.edu/~keystroke/KillourhyMaxion09.pdf</a:t>
+              <a:t>Comparing Anomaly-Detection Algorithms for Keystroke Dynamics. Retrieved from Carnegie Melon University School of Computer Science: https://www.cs.cmu.edu/~keystroke/KillourhyMaxion09.pdf</a:t>
             </a:r>
           </a:p>
           <a:p>

</xml_diff>